<commit_message>
Updated within-groups plots of qualitative codes
</commit_message>
<xml_diff>
--- a/individualmaps.pptx
+++ b/individualmaps.pptx
@@ -5,7 +5,7 @@
     <p:sldMasterId id="2147483648" r:id="rId1"/>
   </p:sldMasterIdLst>
   <p:notesMasterIdLst>
-    <p:notesMasterId r:id="rId7"/>
+    <p:notesMasterId r:id="rId14"/>
   </p:notesMasterIdLst>
   <p:sldIdLst>
     <p:sldId id="256" r:id="rId2"/>
@@ -13,6 +13,13 @@
     <p:sldId id="258" r:id="rId4"/>
     <p:sldId id="259" r:id="rId5"/>
     <p:sldId id="260" r:id="rId6"/>
+    <p:sldId id="261" r:id="rId7"/>
+    <p:sldId id="262" r:id="rId8"/>
+    <p:sldId id="263" r:id="rId9"/>
+    <p:sldId id="264" r:id="rId10"/>
+    <p:sldId id="265" r:id="rId11"/>
+    <p:sldId id="266" r:id="rId12"/>
+    <p:sldId id="267" r:id="rId13"/>
   </p:sldIdLst>
   <p:sldSz cx="12192000" cy="6858000"/>
   <p:notesSz cx="6858000" cy="9144000"/>
@@ -201,7 +208,7 @@
           <a:p>
             <a:fld id="{545E65CD-57B2-4509-A4FC-F089F1DED931}" type="datetimeFigureOut">
               <a:rPr lang="en-US" smtClean="0"/>
-              <a:t>10/27/2021</a:t>
+              <a:t>11/9/2021</a:t>
             </a:fld>
             <a:endParaRPr lang="en-US"/>
           </a:p>
@@ -615,7 +622,7 @@
           <a:p>
             <a:fld id="{46C23AC7-CAD3-4991-AC7A-69A5FF2278A6}" type="datetime1">
               <a:rPr lang="en-US" smtClean="0"/>
-              <a:t>10/27/2021</a:t>
+              <a:t>11/9/2021</a:t>
             </a:fld>
             <a:endParaRPr lang="en-US"/>
           </a:p>
@@ -813,7 +820,7 @@
           <a:p>
             <a:fld id="{EFB9B713-8850-4EC7-AA82-E8422942268A}" type="datetime1">
               <a:rPr lang="en-US" smtClean="0"/>
-              <a:t>10/27/2021</a:t>
+              <a:t>11/9/2021</a:t>
             </a:fld>
             <a:endParaRPr lang="en-US"/>
           </a:p>
@@ -1021,7 +1028,7 @@
           <a:p>
             <a:fld id="{04472B49-0CC5-4650-B771-6D7BDC04CDAC}" type="datetime1">
               <a:rPr lang="en-US" smtClean="0"/>
-              <a:t>10/27/2021</a:t>
+              <a:t>11/9/2021</a:t>
             </a:fld>
             <a:endParaRPr lang="en-US"/>
           </a:p>
@@ -1219,7 +1226,7 @@
           <a:p>
             <a:fld id="{6C6AB477-FF6B-4D99-8B74-00100769E200}" type="datetime1">
               <a:rPr lang="en-US" smtClean="0"/>
-              <a:t>10/27/2021</a:t>
+              <a:t>11/9/2021</a:t>
             </a:fld>
             <a:endParaRPr lang="en-US"/>
           </a:p>
@@ -1494,7 +1501,7 @@
           <a:p>
             <a:fld id="{5B6394E8-4A30-47BC-8D86-FEEC32E71731}" type="datetime1">
               <a:rPr lang="en-US" smtClean="0"/>
-              <a:t>10/27/2021</a:t>
+              <a:t>11/9/2021</a:t>
             </a:fld>
             <a:endParaRPr lang="en-US"/>
           </a:p>
@@ -1759,7 +1766,7 @@
           <a:p>
             <a:fld id="{7E9D8834-0222-4028-B223-C673D073BDD4}" type="datetime1">
               <a:rPr lang="en-US" smtClean="0"/>
-              <a:t>10/27/2021</a:t>
+              <a:t>11/9/2021</a:t>
             </a:fld>
             <a:endParaRPr lang="en-US"/>
           </a:p>
@@ -2171,7 +2178,7 @@
           <a:p>
             <a:fld id="{C6AA874B-2C0A-4395-B488-84118E9E5A02}" type="datetime1">
               <a:rPr lang="en-US" smtClean="0"/>
-              <a:t>10/27/2021</a:t>
+              <a:t>11/9/2021</a:t>
             </a:fld>
             <a:endParaRPr lang="en-US"/>
           </a:p>
@@ -2312,7 +2319,7 @@
           <a:p>
             <a:fld id="{37D7B85B-0D59-482F-821C-FD8F8E608F00}" type="datetime1">
               <a:rPr lang="en-US" smtClean="0"/>
-              <a:t>10/27/2021</a:t>
+              <a:t>11/9/2021</a:t>
             </a:fld>
             <a:endParaRPr lang="en-US"/>
           </a:p>
@@ -2425,7 +2432,7 @@
           <a:p>
             <a:fld id="{3F043AEA-C6B4-4015-8CC5-AD00B8FFFDA2}" type="datetime1">
               <a:rPr lang="en-US" smtClean="0"/>
-              <a:t>10/27/2021</a:t>
+              <a:t>11/9/2021</a:t>
             </a:fld>
             <a:endParaRPr lang="en-US"/>
           </a:p>
@@ -2736,7 +2743,7 @@
           <a:p>
             <a:fld id="{CF4630D9-8669-4B4E-B6E1-1A47A981269C}" type="datetime1">
               <a:rPr lang="en-US" smtClean="0"/>
-              <a:t>10/27/2021</a:t>
+              <a:t>11/9/2021</a:t>
             </a:fld>
             <a:endParaRPr lang="en-US"/>
           </a:p>
@@ -3024,7 +3031,7 @@
           <a:p>
             <a:fld id="{3D60E094-193C-486A-A420-E23B8664E227}" type="datetime1">
               <a:rPr lang="en-US" smtClean="0"/>
-              <a:t>10/27/2021</a:t>
+              <a:t>11/9/2021</a:t>
             </a:fld>
             <a:endParaRPr lang="en-US"/>
           </a:p>
@@ -3265,7 +3272,7 @@
           <a:p>
             <a:fld id="{E871DB1B-3385-4DB1-9C3E-FAF2B1D9BF86}" type="datetime1">
               <a:rPr lang="en-US" smtClean="0"/>
-              <a:t>10/27/2021</a:t>
+              <a:t>11/9/2021</a:t>
             </a:fld>
             <a:endParaRPr lang="en-US"/>
           </a:p>
@@ -3704,8 +3711,8 @@
         </p:blipFill>
         <p:spPr>
           <a:xfrm>
-            <a:off x="772732" y="1094704"/>
-            <a:ext cx="5267459" cy="5112768"/>
+            <a:off x="179418" y="843733"/>
+            <a:ext cx="5783848" cy="5613992"/>
           </a:xfrm>
           <a:prstGeom prst="rect">
             <a:avLst/>
@@ -3733,8 +3740,8 @@
         </p:blipFill>
         <p:spPr>
           <a:xfrm>
-            <a:off x="6265572" y="1094704"/>
-            <a:ext cx="4617076" cy="4353061"/>
+            <a:off x="6228736" y="918474"/>
+            <a:ext cx="5513075" cy="5197825"/>
           </a:xfrm>
           <a:prstGeom prst="rect">
             <a:avLst/>
@@ -3771,13 +3778,8 @@
           <a:p>
             <a:r>
               <a:rPr lang="en-US" dirty="0"/>
-              <a:t>MW 2 </a:t>
-            </a:r>
-            <a:r>
-              <a:rPr lang="en-US" dirty="0" err="1"/>
-              <a:t>SEptember</a:t>
-            </a:r>
-            <a:endParaRPr lang="en-US" dirty="0"/>
+              <a:t>MW 2 September</a:t>
+            </a:r>
           </a:p>
         </p:txBody>
       </p:sp>
@@ -3849,6 +3851,466 @@
     <p:extLst>
       <p:ext uri="{BB962C8B-B14F-4D97-AF65-F5344CB8AC3E}">
         <p14:creationId xmlns:p14="http://schemas.microsoft.com/office/powerpoint/2010/main" val="3700573975"/>
+      </p:ext>
+    </p:extLst>
+  </p:cSld>
+  <p:clrMapOvr>
+    <a:masterClrMapping/>
+  </p:clrMapOvr>
+</p:sld>
+</file>
+
+<file path=ppt/slides/slide10.xml><?xml version="1.0" encoding="utf-8"?>
+<p:sld xmlns:a="http://schemas.openxmlformats.org/drawingml/2006/main" xmlns:r="http://schemas.openxmlformats.org/officeDocument/2006/relationships" xmlns:p="http://schemas.openxmlformats.org/presentationml/2006/main">
+  <p:cSld>
+    <p:spTree>
+      <p:nvGrpSpPr>
+        <p:cNvPr id="1" name=""/>
+        <p:cNvGrpSpPr/>
+        <p:nvPr/>
+      </p:nvGrpSpPr>
+      <p:grpSpPr>
+        <a:xfrm>
+          <a:off x="0" y="0"/>
+          <a:ext cx="0" cy="0"/>
+          <a:chOff x="0" y="0"/>
+          <a:chExt cx="0" cy="0"/>
+        </a:xfrm>
+      </p:grpSpPr>
+      <p:sp>
+        <p:nvSpPr>
+          <p:cNvPr id="4" name="Slide Number Placeholder 3">
+            <a:extLst>
+              <a:ext uri="{FF2B5EF4-FFF2-40B4-BE49-F238E27FC236}">
+                <a16:creationId xmlns:a16="http://schemas.microsoft.com/office/drawing/2014/main" id="{E865FF20-6AF9-4EF2-B692-DD9C83CCBED2}"/>
+              </a:ext>
+            </a:extLst>
+          </p:cNvPr>
+          <p:cNvSpPr>
+            <a:spLocks noGrp="1"/>
+          </p:cNvSpPr>
+          <p:nvPr>
+            <p:ph type="sldNum" sz="quarter" idx="12"/>
+          </p:nvPr>
+        </p:nvSpPr>
+        <p:spPr/>
+        <p:txBody>
+          <a:bodyPr/>
+          <a:lstStyle/>
+          <a:p>
+            <a:fld id="{C65F0D4D-5833-4BE3-87E9-B2DEFD833204}" type="slidenum">
+              <a:rPr lang="en-US" smtClean="0"/>
+              <a:t>10</a:t>
+            </a:fld>
+            <a:endParaRPr lang="en-US"/>
+          </a:p>
+        </p:txBody>
+      </p:sp>
+      <p:sp>
+        <p:nvSpPr>
+          <p:cNvPr id="7" name="TextBox 6">
+            <a:extLst>
+              <a:ext uri="{FF2B5EF4-FFF2-40B4-BE49-F238E27FC236}">
+                <a16:creationId xmlns:a16="http://schemas.microsoft.com/office/drawing/2014/main" id="{C9003309-429F-4E9D-8827-9F69266AA80A}"/>
+              </a:ext>
+            </a:extLst>
+          </p:cNvPr>
+          <p:cNvSpPr txBox="1"/>
+          <p:nvPr/>
+        </p:nvSpPr>
+        <p:spPr>
+          <a:xfrm>
+            <a:off x="674974" y="231197"/>
+            <a:ext cx="1815921" cy="646331"/>
+          </a:xfrm>
+          <a:prstGeom prst="rect">
+            <a:avLst/>
+          </a:prstGeom>
+          <a:noFill/>
+        </p:spPr>
+        <p:txBody>
+          <a:bodyPr wrap="square" rtlCol="0">
+            <a:spAutoFit/>
+          </a:bodyPr>
+          <a:lstStyle/>
+          <a:p>
+            <a:r>
+              <a:rPr lang="en-US" dirty="0"/>
+              <a:t>11TTh September</a:t>
+            </a:r>
+          </a:p>
+        </p:txBody>
+      </p:sp>
+    </p:spTree>
+    <p:extLst>
+      <p:ext uri="{BB962C8B-B14F-4D97-AF65-F5344CB8AC3E}">
+        <p14:creationId xmlns:p14="http://schemas.microsoft.com/office/powerpoint/2010/main" val="1562660849"/>
+      </p:ext>
+    </p:extLst>
+  </p:cSld>
+  <p:clrMapOvr>
+    <a:masterClrMapping/>
+  </p:clrMapOvr>
+</p:sld>
+</file>
+
+<file path=ppt/slides/slide11.xml><?xml version="1.0" encoding="utf-8"?>
+<p:sld xmlns:a="http://schemas.openxmlformats.org/drawingml/2006/main" xmlns:r="http://schemas.openxmlformats.org/officeDocument/2006/relationships" xmlns:p="http://schemas.openxmlformats.org/presentationml/2006/main">
+  <p:cSld>
+    <p:spTree>
+      <p:nvGrpSpPr>
+        <p:cNvPr id="1" name=""/>
+        <p:cNvGrpSpPr/>
+        <p:nvPr/>
+      </p:nvGrpSpPr>
+      <p:grpSpPr>
+        <a:xfrm>
+          <a:off x="0" y="0"/>
+          <a:ext cx="0" cy="0"/>
+          <a:chOff x="0" y="0"/>
+          <a:chExt cx="0" cy="0"/>
+        </a:xfrm>
+      </p:grpSpPr>
+      <p:sp>
+        <p:nvSpPr>
+          <p:cNvPr id="2" name="Title 1">
+            <a:extLst>
+              <a:ext uri="{FF2B5EF4-FFF2-40B4-BE49-F238E27FC236}">
+                <a16:creationId xmlns:a16="http://schemas.microsoft.com/office/drawing/2014/main" id="{C287191D-A27B-477F-AFA1-081D05912B07}"/>
+              </a:ext>
+            </a:extLst>
+          </p:cNvPr>
+          <p:cNvSpPr>
+            <a:spLocks noGrp="1"/>
+          </p:cNvSpPr>
+          <p:nvPr>
+            <p:ph type="title"/>
+          </p:nvPr>
+        </p:nvSpPr>
+        <p:spPr/>
+        <p:txBody>
+          <a:bodyPr/>
+          <a:lstStyle/>
+          <a:p>
+            <a:endParaRPr lang="en-US" dirty="0"/>
+          </a:p>
+        </p:txBody>
+      </p:sp>
+      <p:sp>
+        <p:nvSpPr>
+          <p:cNvPr id="3" name="Content Placeholder 2">
+            <a:extLst>
+              <a:ext uri="{FF2B5EF4-FFF2-40B4-BE49-F238E27FC236}">
+                <a16:creationId xmlns:a16="http://schemas.microsoft.com/office/drawing/2014/main" id="{7A772A5B-D809-4AE0-A4BF-80ED0D9C104B}"/>
+              </a:ext>
+            </a:extLst>
+          </p:cNvPr>
+          <p:cNvSpPr>
+            <a:spLocks noGrp="1"/>
+          </p:cNvSpPr>
+          <p:nvPr>
+            <p:ph idx="1"/>
+          </p:nvPr>
+        </p:nvSpPr>
+        <p:spPr/>
+        <p:txBody>
+          <a:bodyPr/>
+          <a:lstStyle/>
+          <a:p>
+            <a:endParaRPr lang="en-US"/>
+          </a:p>
+        </p:txBody>
+      </p:sp>
+      <p:sp>
+        <p:nvSpPr>
+          <p:cNvPr id="4" name="Slide Number Placeholder 3">
+            <a:extLst>
+              <a:ext uri="{FF2B5EF4-FFF2-40B4-BE49-F238E27FC236}">
+                <a16:creationId xmlns:a16="http://schemas.microsoft.com/office/drawing/2014/main" id="{D7AE1DCC-4765-4C20-9AB7-8173187FA5C6}"/>
+              </a:ext>
+            </a:extLst>
+          </p:cNvPr>
+          <p:cNvSpPr>
+            <a:spLocks noGrp="1"/>
+          </p:cNvSpPr>
+          <p:nvPr>
+            <p:ph type="sldNum" sz="quarter" idx="12"/>
+          </p:nvPr>
+        </p:nvSpPr>
+        <p:spPr/>
+        <p:txBody>
+          <a:bodyPr/>
+          <a:lstStyle/>
+          <a:p>
+            <a:fld id="{C65F0D4D-5833-4BE3-87E9-B2DEFD833204}" type="slidenum">
+              <a:rPr lang="en-US" smtClean="0"/>
+              <a:t>11</a:t>
+            </a:fld>
+            <a:endParaRPr lang="en-US"/>
+          </a:p>
+        </p:txBody>
+      </p:sp>
+      <p:pic>
+        <p:nvPicPr>
+          <p:cNvPr id="5" name="Picture 4" descr="Chart, scatter chart&#10;&#10;Description automatically generated">
+            <a:extLst>
+              <a:ext uri="{FF2B5EF4-FFF2-40B4-BE49-F238E27FC236}">
+                <a16:creationId xmlns:a16="http://schemas.microsoft.com/office/drawing/2014/main" id="{EDC445EC-952E-4540-9EB9-9FD262CB7DFA}"/>
+              </a:ext>
+            </a:extLst>
+          </p:cNvPr>
+          <p:cNvPicPr>
+            <a:picLocks noChangeAspect="1"/>
+          </p:cNvPicPr>
+          <p:nvPr/>
+        </p:nvPicPr>
+        <p:blipFill rotWithShape="1">
+          <a:blip r:embed="rId2"/>
+          <a:srcRect l="29087" t="7858" r="22276" b="17331"/>
+          <a:stretch/>
+        </p:blipFill>
+        <p:spPr bwMode="auto">
+          <a:xfrm>
+            <a:off x="0" y="365125"/>
+            <a:ext cx="7149359" cy="5607532"/>
+          </a:xfrm>
+          <a:prstGeom prst="rect">
+            <a:avLst/>
+          </a:prstGeom>
+          <a:ln>
+            <a:noFill/>
+          </a:ln>
+          <a:extLst>
+            <a:ext uri="{53640926-AAD7-44D8-BBD7-CCE9431645EC}">
+              <a14:shadowObscured xmlns:a14="http://schemas.microsoft.com/office/drawing/2010/main"/>
+            </a:ext>
+          </a:extLst>
+        </p:spPr>
+      </p:pic>
+      <p:pic>
+        <p:nvPicPr>
+          <p:cNvPr id="6" name="Picture 5" descr="Map&#10;&#10;Description automatically generated">
+            <a:extLst>
+              <a:ext uri="{FF2B5EF4-FFF2-40B4-BE49-F238E27FC236}">
+                <a16:creationId xmlns:a16="http://schemas.microsoft.com/office/drawing/2014/main" id="{D03BF11D-2DD2-4F40-BBEA-76F2725052D0}"/>
+              </a:ext>
+            </a:extLst>
+          </p:cNvPr>
+          <p:cNvPicPr>
+            <a:picLocks noChangeAspect="1"/>
+          </p:cNvPicPr>
+          <p:nvPr/>
+        </p:nvPicPr>
+        <p:blipFill rotWithShape="1">
+          <a:blip r:embed="rId3"/>
+          <a:srcRect l="29009" t="10373" r="21875" b="14652"/>
+          <a:stretch/>
+        </p:blipFill>
+        <p:spPr bwMode="auto">
+          <a:xfrm>
+            <a:off x="6258045" y="690650"/>
+            <a:ext cx="6367554" cy="4956482"/>
+          </a:xfrm>
+          <a:prstGeom prst="rect">
+            <a:avLst/>
+          </a:prstGeom>
+          <a:ln>
+            <a:noFill/>
+          </a:ln>
+          <a:extLst>
+            <a:ext uri="{53640926-AAD7-44D8-BBD7-CCE9431645EC}">
+              <a14:shadowObscured xmlns:a14="http://schemas.microsoft.com/office/drawing/2010/main"/>
+            </a:ext>
+          </a:extLst>
+        </p:spPr>
+      </p:pic>
+    </p:spTree>
+    <p:extLst>
+      <p:ext uri="{BB962C8B-B14F-4D97-AF65-F5344CB8AC3E}">
+        <p14:creationId xmlns:p14="http://schemas.microsoft.com/office/powerpoint/2010/main" val="4009420338"/>
+      </p:ext>
+    </p:extLst>
+  </p:cSld>
+  <p:clrMapOvr>
+    <a:masterClrMapping/>
+  </p:clrMapOvr>
+</p:sld>
+</file>
+
+<file path=ppt/slides/slide12.xml><?xml version="1.0" encoding="utf-8"?>
+<p:sld xmlns:a="http://schemas.openxmlformats.org/drawingml/2006/main" xmlns:r="http://schemas.openxmlformats.org/officeDocument/2006/relationships" xmlns:p="http://schemas.openxmlformats.org/presentationml/2006/main">
+  <p:cSld>
+    <p:spTree>
+      <p:nvGrpSpPr>
+        <p:cNvPr id="1" name=""/>
+        <p:cNvGrpSpPr/>
+        <p:nvPr/>
+      </p:nvGrpSpPr>
+      <p:grpSpPr>
+        <a:xfrm>
+          <a:off x="0" y="0"/>
+          <a:ext cx="0" cy="0"/>
+          <a:chOff x="0" y="0"/>
+          <a:chExt cx="0" cy="0"/>
+        </a:xfrm>
+      </p:grpSpPr>
+      <p:sp>
+        <p:nvSpPr>
+          <p:cNvPr id="2" name="Title 1">
+            <a:extLst>
+              <a:ext uri="{FF2B5EF4-FFF2-40B4-BE49-F238E27FC236}">
+                <a16:creationId xmlns:a16="http://schemas.microsoft.com/office/drawing/2014/main" id="{1310186C-C695-4F32-B44B-5E9029FCC505}"/>
+              </a:ext>
+            </a:extLst>
+          </p:cNvPr>
+          <p:cNvSpPr>
+            <a:spLocks noGrp="1"/>
+          </p:cNvSpPr>
+          <p:nvPr>
+            <p:ph type="title"/>
+          </p:nvPr>
+        </p:nvSpPr>
+        <p:spPr/>
+        <p:txBody>
+          <a:bodyPr/>
+          <a:lstStyle/>
+          <a:p>
+            <a:endParaRPr lang="en-US"/>
+          </a:p>
+        </p:txBody>
+      </p:sp>
+      <p:sp>
+        <p:nvSpPr>
+          <p:cNvPr id="3" name="Content Placeholder 2">
+            <a:extLst>
+              <a:ext uri="{FF2B5EF4-FFF2-40B4-BE49-F238E27FC236}">
+                <a16:creationId xmlns:a16="http://schemas.microsoft.com/office/drawing/2014/main" id="{B45EDDF7-E61D-4D5B-A7A8-5C98B7BC1BBC}"/>
+              </a:ext>
+            </a:extLst>
+          </p:cNvPr>
+          <p:cNvSpPr>
+            <a:spLocks noGrp="1"/>
+          </p:cNvSpPr>
+          <p:nvPr>
+            <p:ph idx="1"/>
+          </p:nvPr>
+        </p:nvSpPr>
+        <p:spPr/>
+        <p:txBody>
+          <a:bodyPr/>
+          <a:lstStyle/>
+          <a:p>
+            <a:endParaRPr lang="en-US"/>
+          </a:p>
+        </p:txBody>
+      </p:sp>
+      <p:sp>
+        <p:nvSpPr>
+          <p:cNvPr id="4" name="Slide Number Placeholder 3">
+            <a:extLst>
+              <a:ext uri="{FF2B5EF4-FFF2-40B4-BE49-F238E27FC236}">
+                <a16:creationId xmlns:a16="http://schemas.microsoft.com/office/drawing/2014/main" id="{764C6527-B803-4921-B4E0-1F7A28BD96BC}"/>
+              </a:ext>
+            </a:extLst>
+          </p:cNvPr>
+          <p:cNvSpPr>
+            <a:spLocks noGrp="1"/>
+          </p:cNvSpPr>
+          <p:nvPr>
+            <p:ph type="sldNum" sz="quarter" idx="12"/>
+          </p:nvPr>
+        </p:nvSpPr>
+        <p:spPr/>
+        <p:txBody>
+          <a:bodyPr/>
+          <a:lstStyle/>
+          <a:p>
+            <a:fld id="{C65F0D4D-5833-4BE3-87E9-B2DEFD833204}" type="slidenum">
+              <a:rPr lang="en-US" smtClean="0"/>
+              <a:t>12</a:t>
+            </a:fld>
+            <a:endParaRPr lang="en-US"/>
+          </a:p>
+        </p:txBody>
+      </p:sp>
+      <p:pic>
+        <p:nvPicPr>
+          <p:cNvPr id="5" name="Picture 4" descr="Chart&#10;&#10;Description automatically generated with low confidence">
+            <a:extLst>
+              <a:ext uri="{FF2B5EF4-FFF2-40B4-BE49-F238E27FC236}">
+                <a16:creationId xmlns:a16="http://schemas.microsoft.com/office/drawing/2014/main" id="{043EF00B-60D8-4370-BAA2-3C0C83213E6F}"/>
+              </a:ext>
+            </a:extLst>
+          </p:cNvPr>
+          <p:cNvPicPr>
+            <a:picLocks noChangeAspect="1"/>
+          </p:cNvPicPr>
+          <p:nvPr/>
+        </p:nvPicPr>
+        <p:blipFill rotWithShape="1">
+          <a:blip r:embed="rId2"/>
+          <a:srcRect l="30291" t="7701" r="23477" b="12449"/>
+          <a:stretch/>
+        </p:blipFill>
+        <p:spPr bwMode="auto">
+          <a:xfrm>
+            <a:off x="-321217" y="154188"/>
+            <a:ext cx="7041306" cy="6202162"/>
+          </a:xfrm>
+          <a:prstGeom prst="rect">
+            <a:avLst/>
+          </a:prstGeom>
+          <a:ln>
+            <a:noFill/>
+          </a:ln>
+          <a:extLst>
+            <a:ext uri="{53640926-AAD7-44D8-BBD7-CCE9431645EC}">
+              <a14:shadowObscured xmlns:a14="http://schemas.microsoft.com/office/drawing/2010/main"/>
+            </a:ext>
+          </a:extLst>
+        </p:spPr>
+      </p:pic>
+      <p:pic>
+        <p:nvPicPr>
+          <p:cNvPr id="6" name="Picture 5" descr="Map&#10;&#10;Description automatically generated">
+            <a:extLst>
+              <a:ext uri="{FF2B5EF4-FFF2-40B4-BE49-F238E27FC236}">
+                <a16:creationId xmlns:a16="http://schemas.microsoft.com/office/drawing/2014/main" id="{A4C2B9DA-BD6D-4F19-A3A1-9D010930DECE}"/>
+              </a:ext>
+            </a:extLst>
+          </p:cNvPr>
+          <p:cNvPicPr>
+            <a:picLocks noChangeAspect="1"/>
+          </p:cNvPicPr>
+          <p:nvPr/>
+        </p:nvPicPr>
+        <p:blipFill rotWithShape="1">
+          <a:blip r:embed="rId3"/>
+          <a:srcRect l="31733" t="9744" r="26522" b="16064"/>
+          <a:stretch/>
+        </p:blipFill>
+        <p:spPr bwMode="auto">
+          <a:xfrm>
+            <a:off x="5989028" y="752084"/>
+            <a:ext cx="6059255" cy="5491152"/>
+          </a:xfrm>
+          <a:prstGeom prst="rect">
+            <a:avLst/>
+          </a:prstGeom>
+          <a:ln>
+            <a:noFill/>
+          </a:ln>
+          <a:extLst>
+            <a:ext uri="{53640926-AAD7-44D8-BBD7-CCE9431645EC}">
+              <a14:shadowObscured xmlns:a14="http://schemas.microsoft.com/office/drawing/2010/main"/>
+            </a:ext>
+          </a:extLst>
+        </p:spPr>
+      </p:pic>
+    </p:spTree>
+    <p:extLst>
+      <p:ext uri="{BB962C8B-B14F-4D97-AF65-F5344CB8AC3E}">
+        <p14:creationId xmlns:p14="http://schemas.microsoft.com/office/powerpoint/2010/main" val="573525806"/>
       </p:ext>
     </p:extLst>
   </p:cSld>
@@ -4432,7 +4894,7 @@
         </p:blipFill>
         <p:spPr>
           <a:xfrm>
-            <a:off x="2696497" y="523568"/>
+            <a:off x="2652252" y="427391"/>
             <a:ext cx="6049296" cy="5368414"/>
           </a:xfrm>
           <a:prstGeom prst="rect">
@@ -4479,6 +4941,527 @@
     <p:extLst>
       <p:ext uri="{BB962C8B-B14F-4D97-AF65-F5344CB8AC3E}">
         <p14:creationId xmlns:p14="http://schemas.microsoft.com/office/powerpoint/2010/main" val="3968304436"/>
+      </p:ext>
+    </p:extLst>
+  </p:cSld>
+  <p:clrMapOvr>
+    <a:masterClrMapping/>
+  </p:clrMapOvr>
+</p:sld>
+</file>
+
+<file path=ppt/slides/slide6.xml><?xml version="1.0" encoding="utf-8"?>
+<p:sld xmlns:a="http://schemas.openxmlformats.org/drawingml/2006/main" xmlns:r="http://schemas.openxmlformats.org/officeDocument/2006/relationships" xmlns:p="http://schemas.openxmlformats.org/presentationml/2006/main">
+  <p:cSld>
+    <p:spTree>
+      <p:nvGrpSpPr>
+        <p:cNvPr id="1" name=""/>
+        <p:cNvGrpSpPr/>
+        <p:nvPr/>
+      </p:nvGrpSpPr>
+      <p:grpSpPr>
+        <a:xfrm>
+          <a:off x="0" y="0"/>
+          <a:ext cx="0" cy="0"/>
+          <a:chOff x="0" y="0"/>
+          <a:chExt cx="0" cy="0"/>
+        </a:xfrm>
+      </p:grpSpPr>
+      <p:sp>
+        <p:nvSpPr>
+          <p:cNvPr id="4" name="Slide Number Placeholder 3">
+            <a:extLst>
+              <a:ext uri="{FF2B5EF4-FFF2-40B4-BE49-F238E27FC236}">
+                <a16:creationId xmlns:a16="http://schemas.microsoft.com/office/drawing/2014/main" id="{1B8A2364-A74F-4608-8763-3D148C7DE2B5}"/>
+              </a:ext>
+            </a:extLst>
+          </p:cNvPr>
+          <p:cNvSpPr>
+            <a:spLocks noGrp="1"/>
+          </p:cNvSpPr>
+          <p:nvPr>
+            <p:ph type="sldNum" sz="quarter" idx="12"/>
+          </p:nvPr>
+        </p:nvSpPr>
+        <p:spPr/>
+        <p:txBody>
+          <a:bodyPr/>
+          <a:lstStyle/>
+          <a:p>
+            <a:fld id="{C65F0D4D-5833-4BE3-87E9-B2DEFD833204}" type="slidenum">
+              <a:rPr lang="en-US" smtClean="0"/>
+              <a:t>6</a:t>
+            </a:fld>
+            <a:endParaRPr lang="en-US"/>
+          </a:p>
+        </p:txBody>
+      </p:sp>
+      <p:pic>
+        <p:nvPicPr>
+          <p:cNvPr id="6" name="Picture 5">
+            <a:extLst>
+              <a:ext uri="{FF2B5EF4-FFF2-40B4-BE49-F238E27FC236}">
+                <a16:creationId xmlns:a16="http://schemas.microsoft.com/office/drawing/2014/main" id="{AD275E72-87A5-42C7-922B-7899E722B380}"/>
+              </a:ext>
+            </a:extLst>
+          </p:cNvPr>
+          <p:cNvPicPr>
+            <a:picLocks noChangeAspect="1"/>
+          </p:cNvPicPr>
+          <p:nvPr/>
+        </p:nvPicPr>
+        <p:blipFill rotWithShape="1">
+          <a:blip r:embed="rId2"/>
+          <a:srcRect l="29374" t="8373" r="24638" b="12761"/>
+          <a:stretch/>
+        </p:blipFill>
+        <p:spPr>
+          <a:xfrm>
+            <a:off x="3588776" y="255707"/>
+            <a:ext cx="6587612" cy="5761635"/>
+          </a:xfrm>
+          <a:prstGeom prst="rect">
+            <a:avLst/>
+          </a:prstGeom>
+        </p:spPr>
+      </p:pic>
+      <p:sp>
+        <p:nvSpPr>
+          <p:cNvPr id="7" name="TextBox 6">
+            <a:extLst>
+              <a:ext uri="{FF2B5EF4-FFF2-40B4-BE49-F238E27FC236}">
+                <a16:creationId xmlns:a16="http://schemas.microsoft.com/office/drawing/2014/main" id="{ECB0F1A9-8FA1-4D4A-B32D-661D03FA5B80}"/>
+              </a:ext>
+            </a:extLst>
+          </p:cNvPr>
+          <p:cNvSpPr txBox="1"/>
+          <p:nvPr/>
+        </p:nvSpPr>
+        <p:spPr>
+          <a:xfrm>
+            <a:off x="611435" y="320040"/>
+            <a:ext cx="1815921" cy="369332"/>
+          </a:xfrm>
+          <a:prstGeom prst="rect">
+            <a:avLst/>
+          </a:prstGeom>
+          <a:noFill/>
+        </p:spPr>
+        <p:txBody>
+          <a:bodyPr wrap="square" rtlCol="0">
+            <a:spAutoFit/>
+          </a:bodyPr>
+          <a:lstStyle/>
+          <a:p>
+            <a:r>
+              <a:rPr lang="en-US" dirty="0"/>
+              <a:t>MW7 December</a:t>
+            </a:r>
+          </a:p>
+        </p:txBody>
+      </p:sp>
+    </p:spTree>
+    <p:extLst>
+      <p:ext uri="{BB962C8B-B14F-4D97-AF65-F5344CB8AC3E}">
+        <p14:creationId xmlns:p14="http://schemas.microsoft.com/office/powerpoint/2010/main" val="179786406"/>
+      </p:ext>
+    </p:extLst>
+  </p:cSld>
+  <p:clrMapOvr>
+    <a:masterClrMapping/>
+  </p:clrMapOvr>
+</p:sld>
+</file>
+
+<file path=ppt/slides/slide7.xml><?xml version="1.0" encoding="utf-8"?>
+<p:sld xmlns:a="http://schemas.openxmlformats.org/drawingml/2006/main" xmlns:r="http://schemas.openxmlformats.org/officeDocument/2006/relationships" xmlns:p="http://schemas.openxmlformats.org/presentationml/2006/main">
+  <p:cSld>
+    <p:spTree>
+      <p:nvGrpSpPr>
+        <p:cNvPr id="1" name=""/>
+        <p:cNvGrpSpPr/>
+        <p:nvPr/>
+      </p:nvGrpSpPr>
+      <p:grpSpPr>
+        <a:xfrm>
+          <a:off x="0" y="0"/>
+          <a:ext cx="0" cy="0"/>
+          <a:chOff x="0" y="0"/>
+          <a:chExt cx="0" cy="0"/>
+        </a:xfrm>
+      </p:grpSpPr>
+      <p:sp>
+        <p:nvSpPr>
+          <p:cNvPr id="4" name="Slide Number Placeholder 3">
+            <a:extLst>
+              <a:ext uri="{FF2B5EF4-FFF2-40B4-BE49-F238E27FC236}">
+                <a16:creationId xmlns:a16="http://schemas.microsoft.com/office/drawing/2014/main" id="{7AA9CD6F-EFC0-4635-A810-3F6166185038}"/>
+              </a:ext>
+            </a:extLst>
+          </p:cNvPr>
+          <p:cNvSpPr>
+            <a:spLocks noGrp="1"/>
+          </p:cNvSpPr>
+          <p:nvPr>
+            <p:ph type="sldNum" sz="quarter" idx="12"/>
+          </p:nvPr>
+        </p:nvSpPr>
+        <p:spPr/>
+        <p:txBody>
+          <a:bodyPr/>
+          <a:lstStyle/>
+          <a:p>
+            <a:fld id="{C65F0D4D-5833-4BE3-87E9-B2DEFD833204}" type="slidenum">
+              <a:rPr lang="en-US" smtClean="0"/>
+              <a:t>7</a:t>
+            </a:fld>
+            <a:endParaRPr lang="en-US"/>
+          </a:p>
+        </p:txBody>
+      </p:sp>
+      <p:pic>
+        <p:nvPicPr>
+          <p:cNvPr id="6" name="Picture 5">
+            <a:extLst>
+              <a:ext uri="{FF2B5EF4-FFF2-40B4-BE49-F238E27FC236}">
+                <a16:creationId xmlns:a16="http://schemas.microsoft.com/office/drawing/2014/main" id="{6AE1E6DC-375B-470D-BFD2-CA13C490C455}"/>
+              </a:ext>
+            </a:extLst>
+          </p:cNvPr>
+          <p:cNvPicPr>
+            <a:picLocks noChangeAspect="1"/>
+          </p:cNvPicPr>
+          <p:nvPr/>
+        </p:nvPicPr>
+        <p:blipFill rotWithShape="1">
+          <a:blip r:embed="rId2"/>
+          <a:srcRect l="30302" t="8136" r="24516" b="11694"/>
+          <a:stretch/>
+        </p:blipFill>
+        <p:spPr>
+          <a:xfrm>
+            <a:off x="2131141" y="292705"/>
+            <a:ext cx="6902245" cy="6246207"/>
+          </a:xfrm>
+          <a:prstGeom prst="rect">
+            <a:avLst/>
+          </a:prstGeom>
+        </p:spPr>
+      </p:pic>
+      <p:sp>
+        <p:nvSpPr>
+          <p:cNvPr id="7" name="TextBox 6">
+            <a:extLst>
+              <a:ext uri="{FF2B5EF4-FFF2-40B4-BE49-F238E27FC236}">
+                <a16:creationId xmlns:a16="http://schemas.microsoft.com/office/drawing/2014/main" id="{36F993EF-E5CF-476F-BF0C-DB983C2EDA92}"/>
+              </a:ext>
+            </a:extLst>
+          </p:cNvPr>
+          <p:cNvSpPr txBox="1"/>
+          <p:nvPr/>
+        </p:nvSpPr>
+        <p:spPr>
+          <a:xfrm>
+            <a:off x="611435" y="242725"/>
+            <a:ext cx="1815921" cy="369332"/>
+          </a:xfrm>
+          <a:prstGeom prst="rect">
+            <a:avLst/>
+          </a:prstGeom>
+          <a:noFill/>
+        </p:spPr>
+        <p:txBody>
+          <a:bodyPr wrap="square" rtlCol="0">
+            <a:spAutoFit/>
+          </a:bodyPr>
+          <a:lstStyle/>
+          <a:p>
+            <a:r>
+              <a:rPr lang="en-US" dirty="0"/>
+              <a:t>MW8 December</a:t>
+            </a:r>
+          </a:p>
+        </p:txBody>
+      </p:sp>
+    </p:spTree>
+    <p:extLst>
+      <p:ext uri="{BB962C8B-B14F-4D97-AF65-F5344CB8AC3E}">
+        <p14:creationId xmlns:p14="http://schemas.microsoft.com/office/powerpoint/2010/main" val="3258445672"/>
+      </p:ext>
+    </p:extLst>
+  </p:cSld>
+  <p:clrMapOvr>
+    <a:masterClrMapping/>
+  </p:clrMapOvr>
+</p:sld>
+</file>
+
+<file path=ppt/slides/slide8.xml><?xml version="1.0" encoding="utf-8"?>
+<p:sld xmlns:a="http://schemas.openxmlformats.org/drawingml/2006/main" xmlns:r="http://schemas.openxmlformats.org/officeDocument/2006/relationships" xmlns:p="http://schemas.openxmlformats.org/presentationml/2006/main">
+  <p:cSld>
+    <p:spTree>
+      <p:nvGrpSpPr>
+        <p:cNvPr id="1" name=""/>
+        <p:cNvGrpSpPr/>
+        <p:nvPr/>
+      </p:nvGrpSpPr>
+      <p:grpSpPr>
+        <a:xfrm>
+          <a:off x="0" y="0"/>
+          <a:ext cx="0" cy="0"/>
+          <a:chOff x="0" y="0"/>
+          <a:chExt cx="0" cy="0"/>
+        </a:xfrm>
+      </p:grpSpPr>
+      <p:sp>
+        <p:nvSpPr>
+          <p:cNvPr id="4" name="Slide Number Placeholder 3">
+            <a:extLst>
+              <a:ext uri="{FF2B5EF4-FFF2-40B4-BE49-F238E27FC236}">
+                <a16:creationId xmlns:a16="http://schemas.microsoft.com/office/drawing/2014/main" id="{230EE68E-BDCE-4C5F-B79C-14CF6912443E}"/>
+              </a:ext>
+            </a:extLst>
+          </p:cNvPr>
+          <p:cNvSpPr>
+            <a:spLocks noGrp="1"/>
+          </p:cNvSpPr>
+          <p:nvPr>
+            <p:ph type="sldNum" sz="quarter" idx="12"/>
+          </p:nvPr>
+        </p:nvSpPr>
+        <p:spPr/>
+        <p:txBody>
+          <a:bodyPr/>
+          <a:lstStyle/>
+          <a:p>
+            <a:fld id="{C65F0D4D-5833-4BE3-87E9-B2DEFD833204}" type="slidenum">
+              <a:rPr lang="en-US" smtClean="0"/>
+              <a:t>8</a:t>
+            </a:fld>
+            <a:endParaRPr lang="en-US"/>
+          </a:p>
+        </p:txBody>
+      </p:sp>
+      <p:pic>
+        <p:nvPicPr>
+          <p:cNvPr id="6" name="Picture 5">
+            <a:extLst>
+              <a:ext uri="{FF2B5EF4-FFF2-40B4-BE49-F238E27FC236}">
+                <a16:creationId xmlns:a16="http://schemas.microsoft.com/office/drawing/2014/main" id="{AE726BE4-6E82-4A67-89FB-7D2E4FFA15A1}"/>
+              </a:ext>
+            </a:extLst>
+          </p:cNvPr>
+          <p:cNvPicPr>
+            <a:picLocks noChangeAspect="1"/>
+          </p:cNvPicPr>
+          <p:nvPr/>
+        </p:nvPicPr>
+        <p:blipFill rotWithShape="1">
+          <a:blip r:embed="rId2"/>
+          <a:srcRect l="28246" t="8373" r="25060" b="10508"/>
+          <a:stretch/>
+        </p:blipFill>
+        <p:spPr>
+          <a:xfrm>
+            <a:off x="191730" y="242725"/>
+            <a:ext cx="7434034" cy="6586629"/>
+          </a:xfrm>
+          <a:prstGeom prst="rect">
+            <a:avLst/>
+          </a:prstGeom>
+        </p:spPr>
+      </p:pic>
+      <p:sp>
+        <p:nvSpPr>
+          <p:cNvPr id="7" name="TextBox 6">
+            <a:extLst>
+              <a:ext uri="{FF2B5EF4-FFF2-40B4-BE49-F238E27FC236}">
+                <a16:creationId xmlns:a16="http://schemas.microsoft.com/office/drawing/2014/main" id="{B43EB267-56C0-45E9-A524-D05C4A764262}"/>
+              </a:ext>
+            </a:extLst>
+          </p:cNvPr>
+          <p:cNvSpPr txBox="1"/>
+          <p:nvPr/>
+        </p:nvSpPr>
+        <p:spPr>
+          <a:xfrm>
+            <a:off x="611435" y="242725"/>
+            <a:ext cx="1815921" cy="369332"/>
+          </a:xfrm>
+          <a:prstGeom prst="rect">
+            <a:avLst/>
+          </a:prstGeom>
+          <a:noFill/>
+        </p:spPr>
+        <p:txBody>
+          <a:bodyPr wrap="square" rtlCol="0">
+            <a:spAutoFit/>
+          </a:bodyPr>
+          <a:lstStyle/>
+          <a:p>
+            <a:r>
+              <a:rPr lang="en-US" dirty="0"/>
+              <a:t>9TTh September</a:t>
+            </a:r>
+          </a:p>
+        </p:txBody>
+      </p:sp>
+    </p:spTree>
+    <p:extLst>
+      <p:ext uri="{BB962C8B-B14F-4D97-AF65-F5344CB8AC3E}">
+        <p14:creationId xmlns:p14="http://schemas.microsoft.com/office/powerpoint/2010/main" val="1536175140"/>
+      </p:ext>
+    </p:extLst>
+  </p:cSld>
+  <p:clrMapOvr>
+    <a:masterClrMapping/>
+  </p:clrMapOvr>
+</p:sld>
+</file>
+
+<file path=ppt/slides/slide9.xml><?xml version="1.0" encoding="utf-8"?>
+<p:sld xmlns:a="http://schemas.openxmlformats.org/drawingml/2006/main" xmlns:r="http://schemas.openxmlformats.org/officeDocument/2006/relationships" xmlns:p="http://schemas.openxmlformats.org/presentationml/2006/main">
+  <p:cSld>
+    <p:spTree>
+      <p:nvGrpSpPr>
+        <p:cNvPr id="1" name=""/>
+        <p:cNvGrpSpPr/>
+        <p:nvPr/>
+      </p:nvGrpSpPr>
+      <p:grpSpPr>
+        <a:xfrm>
+          <a:off x="0" y="0"/>
+          <a:ext cx="0" cy="0"/>
+          <a:chOff x="0" y="0"/>
+          <a:chExt cx="0" cy="0"/>
+        </a:xfrm>
+      </p:grpSpPr>
+      <p:sp>
+        <p:nvSpPr>
+          <p:cNvPr id="4" name="Slide Number Placeholder 3">
+            <a:extLst>
+              <a:ext uri="{FF2B5EF4-FFF2-40B4-BE49-F238E27FC236}">
+                <a16:creationId xmlns:a16="http://schemas.microsoft.com/office/drawing/2014/main" id="{1258DF2E-4B75-4FF9-B3A2-E258AD2642B1}"/>
+              </a:ext>
+            </a:extLst>
+          </p:cNvPr>
+          <p:cNvSpPr>
+            <a:spLocks noGrp="1"/>
+          </p:cNvSpPr>
+          <p:nvPr>
+            <p:ph type="sldNum" sz="quarter" idx="12"/>
+          </p:nvPr>
+        </p:nvSpPr>
+        <p:spPr/>
+        <p:txBody>
+          <a:bodyPr/>
+          <a:lstStyle/>
+          <a:p>
+            <a:fld id="{C65F0D4D-5833-4BE3-87E9-B2DEFD833204}" type="slidenum">
+              <a:rPr lang="en-US" smtClean="0"/>
+              <a:t>9</a:t>
+            </a:fld>
+            <a:endParaRPr lang="en-US"/>
+          </a:p>
+        </p:txBody>
+      </p:sp>
+      <p:pic>
+        <p:nvPicPr>
+          <p:cNvPr id="8" name="Picture 7">
+            <a:extLst>
+              <a:ext uri="{FF2B5EF4-FFF2-40B4-BE49-F238E27FC236}">
+                <a16:creationId xmlns:a16="http://schemas.microsoft.com/office/drawing/2014/main" id="{EC8EC1F4-4B63-42F9-A07B-6547322AF093}"/>
+              </a:ext>
+            </a:extLst>
+          </p:cNvPr>
+          <p:cNvPicPr>
+            <a:picLocks noChangeAspect="1"/>
+          </p:cNvPicPr>
+          <p:nvPr/>
+        </p:nvPicPr>
+        <p:blipFill rotWithShape="1">
+          <a:blip r:embed="rId2"/>
+          <a:srcRect l="30707" t="5287" r="23915" b="13492"/>
+          <a:stretch/>
+        </p:blipFill>
+        <p:spPr>
+          <a:xfrm>
+            <a:off x="200216" y="896198"/>
+            <a:ext cx="5831459" cy="5323268"/>
+          </a:xfrm>
+          <a:prstGeom prst="rect">
+            <a:avLst/>
+          </a:prstGeom>
+        </p:spPr>
+      </p:pic>
+      <p:sp>
+        <p:nvSpPr>
+          <p:cNvPr id="7" name="TextBox 6">
+            <a:extLst>
+              <a:ext uri="{FF2B5EF4-FFF2-40B4-BE49-F238E27FC236}">
+                <a16:creationId xmlns:a16="http://schemas.microsoft.com/office/drawing/2014/main" id="{4A02097E-7B3F-47D4-AC55-113F4535EC98}"/>
+              </a:ext>
+            </a:extLst>
+          </p:cNvPr>
+          <p:cNvSpPr txBox="1"/>
+          <p:nvPr/>
+        </p:nvSpPr>
+        <p:spPr>
+          <a:xfrm>
+            <a:off x="778212" y="249867"/>
+            <a:ext cx="1815921" cy="646331"/>
+          </a:xfrm>
+          <a:prstGeom prst="rect">
+            <a:avLst/>
+          </a:prstGeom>
+          <a:noFill/>
+        </p:spPr>
+        <p:txBody>
+          <a:bodyPr wrap="square" rtlCol="0">
+            <a:spAutoFit/>
+          </a:bodyPr>
+          <a:lstStyle/>
+          <a:p>
+            <a:r>
+              <a:rPr lang="en-US" dirty="0"/>
+              <a:t>10TTh September</a:t>
+            </a:r>
+          </a:p>
+        </p:txBody>
+      </p:sp>
+      <p:pic>
+        <p:nvPicPr>
+          <p:cNvPr id="9" name="Picture 8">
+            <a:extLst>
+              <a:ext uri="{FF2B5EF4-FFF2-40B4-BE49-F238E27FC236}">
+                <a16:creationId xmlns:a16="http://schemas.microsoft.com/office/drawing/2014/main" id="{AE44A4A8-8B08-4315-B7AD-258F09C62AD7}"/>
+              </a:ext>
+            </a:extLst>
+          </p:cNvPr>
+          <p:cNvPicPr>
+            <a:picLocks noChangeAspect="1"/>
+          </p:cNvPicPr>
+          <p:nvPr/>
+        </p:nvPicPr>
+        <p:blipFill rotWithShape="1">
+          <a:blip r:embed="rId3"/>
+          <a:srcRect l="30605" t="10151" r="25242" b="11694"/>
+          <a:stretch/>
+        </p:blipFill>
+        <p:spPr>
+          <a:xfrm>
+            <a:off x="6245527" y="896198"/>
+            <a:ext cx="5896789" cy="5323268"/>
+          </a:xfrm>
+          <a:prstGeom prst="rect">
+            <a:avLst/>
+          </a:prstGeom>
+        </p:spPr>
+      </p:pic>
+    </p:spTree>
+    <p:extLst>
+      <p:ext uri="{BB962C8B-B14F-4D97-AF65-F5344CB8AC3E}">
+        <p14:creationId xmlns:p14="http://schemas.microsoft.com/office/powerpoint/2010/main" val="2248823037"/>
       </p:ext>
     </p:extLst>
   </p:cSld>

</xml_diff>